<commit_message>
Updated Name and added Thank You slide
</commit_message>
<xml_diff>
--- a/Passion Games.pptx
+++ b/Passion Games.pptx
@@ -5,7 +5,7 @@
     <p:sldMasterId id="2147483660" r:id="rId1"/>
   </p:sldMasterIdLst>
   <p:notesMasterIdLst>
-    <p:notesMasterId r:id="rId16"/>
+    <p:notesMasterId r:id="rId17"/>
   </p:notesMasterIdLst>
   <p:sldIdLst>
     <p:sldId id="256" r:id="rId2"/>
@@ -22,6 +22,7 @@
     <p:sldId id="266" r:id="rId13"/>
     <p:sldId id="267" r:id="rId14"/>
     <p:sldId id="268" r:id="rId15"/>
+    <p:sldId id="271" r:id="rId16"/>
   </p:sldIdLst>
   <p:sldSz cx="12192000" cy="6858000"/>
   <p:notesSz cx="6858000" cy="9144000"/>
@@ -214,7 +215,7 @@
           <a:p>
             <a:fld id="{7EBDAB4E-BA76-40EF-969B-96D7D9B5E973}" type="datetimeFigureOut">
               <a:rPr lang="en-GB" smtClean="0"/>
-              <a:t>27/09/2017</a:t>
+              <a:t>28/09/2017</a:t>
             </a:fld>
             <a:endParaRPr lang="en-GB"/>
           </a:p>
@@ -2068,7 +2069,7 @@
           <a:noFill/>
           <a:extLst>
             <a:ext uri="{909E8E84-426E-40dd-AFC4-6F175D3DCCD1}">
-              <a14:hiddenFill xmlns:a14="http://schemas.microsoft.com/office/drawing/2010/main" xmlns="">
+              <a14:hiddenFill xmlns="" xmlns:a14="http://schemas.microsoft.com/office/drawing/2010/main">
                 <a:solidFill>
                   <a:srgbClr val="FFFFFF"/>
                 </a:solidFill>
@@ -2128,7 +2129,7 @@
             </a:ln>
             <a:extLst>
               <a:ext uri="{91240B29-F687-4f45-9708-019B960494DF}">
-                <a14:hiddenLine xmlns:a14="http://schemas.microsoft.com/office/drawing/2010/main" xmlns="" w="9525">
+                <a14:hiddenLine xmlns="" xmlns:a14="http://schemas.microsoft.com/office/drawing/2010/main" w="9525">
                   <a:solidFill>
                     <a:srgbClr val="000000"/>
                   </a:solidFill>
@@ -2218,7 +2219,7 @@
             </a:ln>
             <a:extLst>
               <a:ext uri="{91240B29-F687-4f45-9708-019B960494DF}">
-                <a14:hiddenLine xmlns:a14="http://schemas.microsoft.com/office/drawing/2010/main" xmlns="" w="9525">
+                <a14:hiddenLine xmlns="" xmlns:a14="http://schemas.microsoft.com/office/drawing/2010/main" w="9525">
                   <a:solidFill>
                     <a:srgbClr val="000000"/>
                   </a:solidFill>
@@ -2308,7 +2309,7 @@
             </a:ln>
             <a:extLst>
               <a:ext uri="{91240B29-F687-4f45-9708-019B960494DF}">
-                <a14:hiddenLine xmlns:a14="http://schemas.microsoft.com/office/drawing/2010/main" xmlns="" w="9525">
+                <a14:hiddenLine xmlns="" xmlns:a14="http://schemas.microsoft.com/office/drawing/2010/main" w="9525">
                   <a:solidFill>
                     <a:srgbClr val="000000"/>
                   </a:solidFill>
@@ -2342,7 +2343,7 @@
             </a:ln>
             <a:extLst>
               <a:ext uri="{91240B29-F687-4f45-9708-019B960494DF}">
-                <a14:hiddenLine xmlns:a14="http://schemas.microsoft.com/office/drawing/2010/main" xmlns="" w="9525">
+                <a14:hiddenLine xmlns="" xmlns:a14="http://schemas.microsoft.com/office/drawing/2010/main" w="9525">
                   <a:solidFill>
                     <a:srgbClr val="000000"/>
                   </a:solidFill>
@@ -2432,7 +2433,7 @@
             </a:ln>
             <a:extLst>
               <a:ext uri="{91240B29-F687-4f45-9708-019B960494DF}">
-                <a14:hiddenLine xmlns:a14="http://schemas.microsoft.com/office/drawing/2010/main" xmlns="" w="9525">
+                <a14:hiddenLine xmlns="" xmlns:a14="http://schemas.microsoft.com/office/drawing/2010/main" w="9525">
                   <a:solidFill>
                     <a:srgbClr val="000000"/>
                   </a:solidFill>
@@ -2494,7 +2495,7 @@
             </a:ln>
             <a:extLst>
               <a:ext uri="{91240B29-F687-4f45-9708-019B960494DF}">
-                <a14:hiddenLine xmlns:a14="http://schemas.microsoft.com/office/drawing/2010/main" xmlns="" w="9525">
+                <a14:hiddenLine xmlns="" xmlns:a14="http://schemas.microsoft.com/office/drawing/2010/main" w="9525">
                   <a:solidFill>
                     <a:srgbClr val="000000"/>
                   </a:solidFill>
@@ -2556,7 +2557,7 @@
             </a:ln>
             <a:extLst>
               <a:ext uri="{91240B29-F687-4f45-9708-019B960494DF}">
-                <a14:hiddenLine xmlns:a14="http://schemas.microsoft.com/office/drawing/2010/main" xmlns="" w="9525">
+                <a14:hiddenLine xmlns="" xmlns:a14="http://schemas.microsoft.com/office/drawing/2010/main" w="9525">
                   <a:solidFill>
                     <a:srgbClr val="000000"/>
                   </a:solidFill>
@@ -2646,7 +2647,7 @@
             </a:ln>
             <a:extLst>
               <a:ext uri="{91240B29-F687-4f45-9708-019B960494DF}">
-                <a14:hiddenLine xmlns:a14="http://schemas.microsoft.com/office/drawing/2010/main" xmlns="" w="9525">
+                <a14:hiddenLine xmlns="" xmlns:a14="http://schemas.microsoft.com/office/drawing/2010/main" w="9525">
                   <a:solidFill>
                     <a:srgbClr val="000000"/>
                   </a:solidFill>
@@ -2708,7 +2709,7 @@
             </a:ln>
             <a:extLst>
               <a:ext uri="{91240B29-F687-4f45-9708-019B960494DF}">
-                <a14:hiddenLine xmlns:a14="http://schemas.microsoft.com/office/drawing/2010/main" xmlns="" w="9525">
+                <a14:hiddenLine xmlns="" xmlns:a14="http://schemas.microsoft.com/office/drawing/2010/main" w="9525">
                   <a:solidFill>
                     <a:srgbClr val="000000"/>
                   </a:solidFill>
@@ -2770,7 +2771,7 @@
             </a:ln>
             <a:extLst>
               <a:ext uri="{91240B29-F687-4f45-9708-019B960494DF}">
-                <a14:hiddenLine xmlns:a14="http://schemas.microsoft.com/office/drawing/2010/main" xmlns="" w="9525">
+                <a14:hiddenLine xmlns="" xmlns:a14="http://schemas.microsoft.com/office/drawing/2010/main" w="9525">
                   <a:solidFill>
                     <a:srgbClr val="000000"/>
                   </a:solidFill>
@@ -2860,7 +2861,7 @@
             </a:ln>
             <a:extLst>
               <a:ext uri="{91240B29-F687-4f45-9708-019B960494DF}">
-                <a14:hiddenLine xmlns:a14="http://schemas.microsoft.com/office/drawing/2010/main" xmlns="" w="9525">
+                <a14:hiddenLine xmlns="" xmlns:a14="http://schemas.microsoft.com/office/drawing/2010/main" w="9525">
                   <a:solidFill>
                     <a:srgbClr val="000000"/>
                   </a:solidFill>
@@ -2950,7 +2951,7 @@
             </a:ln>
             <a:extLst>
               <a:ext uri="{91240B29-F687-4f45-9708-019B960494DF}">
-                <a14:hiddenLine xmlns:a14="http://schemas.microsoft.com/office/drawing/2010/main" xmlns="" w="9525">
+                <a14:hiddenLine xmlns="" xmlns:a14="http://schemas.microsoft.com/office/drawing/2010/main" w="9525">
                   <a:solidFill>
                     <a:srgbClr val="000000"/>
                   </a:solidFill>
@@ -3012,7 +3013,7 @@
             </a:ln>
             <a:extLst>
               <a:ext uri="{91240B29-F687-4f45-9708-019B960494DF}">
-                <a14:hiddenLine xmlns:a14="http://schemas.microsoft.com/office/drawing/2010/main" xmlns="" w="9525">
+                <a14:hiddenLine xmlns="" xmlns:a14="http://schemas.microsoft.com/office/drawing/2010/main" w="9525">
                   <a:solidFill>
                     <a:srgbClr val="000000"/>
                   </a:solidFill>
@@ -3122,7 +3123,7 @@
             </a:ln>
             <a:extLst>
               <a:ext uri="{91240B29-F687-4f45-9708-019B960494DF}">
-                <a14:hiddenLine xmlns:a14="http://schemas.microsoft.com/office/drawing/2010/main" xmlns="" w="9525">
+                <a14:hiddenLine xmlns="" xmlns:a14="http://schemas.microsoft.com/office/drawing/2010/main" w="9525">
                   <a:solidFill>
                     <a:srgbClr val="000000"/>
                   </a:solidFill>
@@ -3184,7 +3185,7 @@
             </a:ln>
             <a:extLst>
               <a:ext uri="{91240B29-F687-4f45-9708-019B960494DF}">
-                <a14:hiddenLine xmlns:a14="http://schemas.microsoft.com/office/drawing/2010/main" xmlns="" w="9525">
+                <a14:hiddenLine xmlns="" xmlns:a14="http://schemas.microsoft.com/office/drawing/2010/main" w="9525">
                   <a:solidFill>
                     <a:srgbClr val="000000"/>
                   </a:solidFill>
@@ -3274,7 +3275,7 @@
             </a:ln>
             <a:extLst>
               <a:ext uri="{91240B29-F687-4f45-9708-019B960494DF}">
-                <a14:hiddenLine xmlns:a14="http://schemas.microsoft.com/office/drawing/2010/main" xmlns="" w="9525">
+                <a14:hiddenLine xmlns="" xmlns:a14="http://schemas.microsoft.com/office/drawing/2010/main" w="9525">
                   <a:solidFill>
                     <a:srgbClr val="000000"/>
                   </a:solidFill>
@@ -3364,7 +3365,7 @@
             </a:ln>
             <a:extLst>
               <a:ext uri="{91240B29-F687-4f45-9708-019B960494DF}">
-                <a14:hiddenLine xmlns:a14="http://schemas.microsoft.com/office/drawing/2010/main" xmlns="" w="9525">
+                <a14:hiddenLine xmlns="" xmlns:a14="http://schemas.microsoft.com/office/drawing/2010/main" w="9525">
                   <a:solidFill>
                     <a:srgbClr val="000000"/>
                   </a:solidFill>
@@ -3426,7 +3427,7 @@
             </a:ln>
             <a:extLst>
               <a:ext uri="{91240B29-F687-4f45-9708-019B960494DF}">
-                <a14:hiddenLine xmlns:a14="http://schemas.microsoft.com/office/drawing/2010/main" xmlns="" w="9525">
+                <a14:hiddenLine xmlns="" xmlns:a14="http://schemas.microsoft.com/office/drawing/2010/main" w="9525">
                   <a:solidFill>
                     <a:srgbClr val="000000"/>
                   </a:solidFill>
@@ -3516,7 +3517,7 @@
             </a:ln>
             <a:extLst>
               <a:ext uri="{91240B29-F687-4f45-9708-019B960494DF}">
-                <a14:hiddenLine xmlns:a14="http://schemas.microsoft.com/office/drawing/2010/main" xmlns="" w="9525">
+                <a14:hiddenLine xmlns="" xmlns:a14="http://schemas.microsoft.com/office/drawing/2010/main" w="9525">
                   <a:solidFill>
                     <a:srgbClr val="000000"/>
                   </a:solidFill>
@@ -3606,7 +3607,7 @@
             </a:ln>
             <a:extLst>
               <a:ext uri="{91240B29-F687-4f45-9708-019B960494DF}">
-                <a14:hiddenLine xmlns:a14="http://schemas.microsoft.com/office/drawing/2010/main" xmlns="" w="9525">
+                <a14:hiddenLine xmlns="" xmlns:a14="http://schemas.microsoft.com/office/drawing/2010/main" w="9525">
                   <a:solidFill>
                     <a:srgbClr val="000000"/>
                   </a:solidFill>
@@ -3662,7 +3663,7 @@
             </a:ln>
             <a:extLst>
               <a:ext uri="{91240B29-F687-4f45-9708-019B960494DF}">
-                <a14:hiddenLine xmlns:a14="http://schemas.microsoft.com/office/drawing/2010/main" xmlns="" w="9525">
+                <a14:hiddenLine xmlns="" xmlns:a14="http://schemas.microsoft.com/office/drawing/2010/main" w="9525">
                   <a:solidFill>
                     <a:srgbClr val="000000"/>
                   </a:solidFill>
@@ -3752,7 +3753,7 @@
             </a:ln>
             <a:extLst>
               <a:ext uri="{91240B29-F687-4f45-9708-019B960494DF}">
-                <a14:hiddenLine xmlns:a14="http://schemas.microsoft.com/office/drawing/2010/main" xmlns="" w="9525">
+                <a14:hiddenLine xmlns="" xmlns:a14="http://schemas.microsoft.com/office/drawing/2010/main" w="9525">
                   <a:solidFill>
                     <a:srgbClr val="000000"/>
                   </a:solidFill>
@@ -3808,7 +3809,7 @@
             </a:ln>
             <a:extLst>
               <a:ext uri="{91240B29-F687-4f45-9708-019B960494DF}">
-                <a14:hiddenLine xmlns:a14="http://schemas.microsoft.com/office/drawing/2010/main" xmlns="" w="9525">
+                <a14:hiddenLine xmlns="" xmlns:a14="http://schemas.microsoft.com/office/drawing/2010/main" w="9525">
                   <a:solidFill>
                     <a:srgbClr val="000000"/>
                   </a:solidFill>
@@ -3898,7 +3899,7 @@
             </a:ln>
             <a:extLst>
               <a:ext uri="{91240B29-F687-4f45-9708-019B960494DF}">
-                <a14:hiddenLine xmlns:a14="http://schemas.microsoft.com/office/drawing/2010/main" xmlns="" w="9525">
+                <a14:hiddenLine xmlns="" xmlns:a14="http://schemas.microsoft.com/office/drawing/2010/main" w="9525">
                   <a:solidFill>
                     <a:srgbClr val="000000"/>
                   </a:solidFill>
@@ -3966,7 +3967,7 @@
             </a:ln>
             <a:extLst>
               <a:ext uri="{91240B29-F687-4f45-9708-019B960494DF}">
-                <a14:hiddenLine xmlns:a14="http://schemas.microsoft.com/office/drawing/2010/main" xmlns="" w="9525">
+                <a14:hiddenLine xmlns="" xmlns:a14="http://schemas.microsoft.com/office/drawing/2010/main" w="9525">
                   <a:solidFill>
                     <a:srgbClr val="000000"/>
                   </a:solidFill>
@@ -4056,7 +4057,7 @@
             </a:ln>
             <a:extLst>
               <a:ext uri="{91240B29-F687-4f45-9708-019B960494DF}">
-                <a14:hiddenLine xmlns:a14="http://schemas.microsoft.com/office/drawing/2010/main" xmlns="" w="9525">
+                <a14:hiddenLine xmlns="" xmlns:a14="http://schemas.microsoft.com/office/drawing/2010/main" w="9525">
                   <a:solidFill>
                     <a:srgbClr val="000000"/>
                   </a:solidFill>
@@ -4124,7 +4125,7 @@
             </a:ln>
             <a:extLst>
               <a:ext uri="{91240B29-F687-4f45-9708-019B960494DF}">
-                <a14:hiddenLine xmlns:a14="http://schemas.microsoft.com/office/drawing/2010/main" xmlns="" w="9525">
+                <a14:hiddenLine xmlns="" xmlns:a14="http://schemas.microsoft.com/office/drawing/2010/main" w="9525">
                   <a:solidFill>
                     <a:srgbClr val="000000"/>
                   </a:solidFill>
@@ -4214,7 +4215,7 @@
             </a:ln>
             <a:extLst>
               <a:ext uri="{91240B29-F687-4f45-9708-019B960494DF}">
-                <a14:hiddenLine xmlns:a14="http://schemas.microsoft.com/office/drawing/2010/main" xmlns="" w="9525">
+                <a14:hiddenLine xmlns="" xmlns:a14="http://schemas.microsoft.com/office/drawing/2010/main" w="9525">
                   <a:solidFill>
                     <a:srgbClr val="000000"/>
                   </a:solidFill>
@@ -4248,7 +4249,7 @@
             </a:ln>
             <a:extLst>
               <a:ext uri="{91240B29-F687-4f45-9708-019B960494DF}">
-                <a14:hiddenLine xmlns:a14="http://schemas.microsoft.com/office/drawing/2010/main" xmlns="" w="9525">
+                <a14:hiddenLine xmlns="" xmlns:a14="http://schemas.microsoft.com/office/drawing/2010/main" w="9525">
                   <a:solidFill>
                     <a:srgbClr val="000000"/>
                   </a:solidFill>
@@ -4338,7 +4339,7 @@
             </a:ln>
             <a:extLst>
               <a:ext uri="{91240B29-F687-4f45-9708-019B960494DF}">
-                <a14:hiddenLine xmlns:a14="http://schemas.microsoft.com/office/drawing/2010/main" xmlns="" w="9525">
+                <a14:hiddenLine xmlns="" xmlns:a14="http://schemas.microsoft.com/office/drawing/2010/main" w="9525">
                   <a:solidFill>
                     <a:srgbClr val="000000"/>
                   </a:solidFill>
@@ -4400,7 +4401,7 @@
             </a:ln>
             <a:extLst>
               <a:ext uri="{91240B29-F687-4f45-9708-019B960494DF}">
-                <a14:hiddenLine xmlns:a14="http://schemas.microsoft.com/office/drawing/2010/main" xmlns="" w="9525">
+                <a14:hiddenLine xmlns="" xmlns:a14="http://schemas.microsoft.com/office/drawing/2010/main" w="9525">
                   <a:solidFill>
                     <a:srgbClr val="000000"/>
                   </a:solidFill>
@@ -4462,7 +4463,7 @@
             </a:ln>
             <a:extLst>
               <a:ext uri="{91240B29-F687-4f45-9708-019B960494DF}">
-                <a14:hiddenLine xmlns:a14="http://schemas.microsoft.com/office/drawing/2010/main" xmlns="" w="9525">
+                <a14:hiddenLine xmlns="" xmlns:a14="http://schemas.microsoft.com/office/drawing/2010/main" w="9525">
                   <a:solidFill>
                     <a:srgbClr val="000000"/>
                   </a:solidFill>
@@ -4552,7 +4553,7 @@
             </a:ln>
             <a:extLst>
               <a:ext uri="{91240B29-F687-4f45-9708-019B960494DF}">
-                <a14:hiddenLine xmlns:a14="http://schemas.microsoft.com/office/drawing/2010/main" xmlns="" w="9525">
+                <a14:hiddenLine xmlns="" xmlns:a14="http://schemas.microsoft.com/office/drawing/2010/main" w="9525">
                   <a:solidFill>
                     <a:srgbClr val="000000"/>
                   </a:solidFill>
@@ -4620,7 +4621,7 @@
             </a:ln>
             <a:extLst>
               <a:ext uri="{91240B29-F687-4f45-9708-019B960494DF}">
-                <a14:hiddenLine xmlns:a14="http://schemas.microsoft.com/office/drawing/2010/main" xmlns="" w="9525">
+                <a14:hiddenLine xmlns="" xmlns:a14="http://schemas.microsoft.com/office/drawing/2010/main" w="9525">
                   <a:solidFill>
                     <a:srgbClr val="000000"/>
                   </a:solidFill>
@@ -4682,7 +4683,7 @@
             </a:ln>
             <a:extLst>
               <a:ext uri="{91240B29-F687-4f45-9708-019B960494DF}">
-                <a14:hiddenLine xmlns:a14="http://schemas.microsoft.com/office/drawing/2010/main" xmlns="" w="9525">
+                <a14:hiddenLine xmlns="" xmlns:a14="http://schemas.microsoft.com/office/drawing/2010/main" w="9525">
                   <a:solidFill>
                     <a:srgbClr val="000000"/>
                   </a:solidFill>
@@ -4772,7 +4773,7 @@
             </a:ln>
             <a:extLst>
               <a:ext uri="{91240B29-F687-4f45-9708-019B960494DF}">
-                <a14:hiddenLine xmlns:a14="http://schemas.microsoft.com/office/drawing/2010/main" xmlns="" w="9525">
+                <a14:hiddenLine xmlns="" xmlns:a14="http://schemas.microsoft.com/office/drawing/2010/main" w="9525">
                   <a:solidFill>
                     <a:srgbClr val="000000"/>
                   </a:solidFill>
@@ -4834,7 +4835,7 @@
             </a:ln>
             <a:extLst>
               <a:ext uri="{91240B29-F687-4f45-9708-019B960494DF}">
-                <a14:hiddenLine xmlns:a14="http://schemas.microsoft.com/office/drawing/2010/main" xmlns="" w="9525">
+                <a14:hiddenLine xmlns="" xmlns:a14="http://schemas.microsoft.com/office/drawing/2010/main" w="9525">
                   <a:solidFill>
                     <a:srgbClr val="000000"/>
                   </a:solidFill>
@@ -4924,7 +4925,7 @@
             </a:ln>
             <a:extLst>
               <a:ext uri="{91240B29-F687-4f45-9708-019B960494DF}">
-                <a14:hiddenLine xmlns:a14="http://schemas.microsoft.com/office/drawing/2010/main" xmlns="" w="9525">
+                <a14:hiddenLine xmlns="" xmlns:a14="http://schemas.microsoft.com/office/drawing/2010/main" w="9525">
                   <a:solidFill>
                     <a:srgbClr val="000000"/>
                   </a:solidFill>
@@ -4986,7 +4987,7 @@
             </a:ln>
             <a:extLst>
               <a:ext uri="{91240B29-F687-4f45-9708-019B960494DF}">
-                <a14:hiddenLine xmlns:a14="http://schemas.microsoft.com/office/drawing/2010/main" xmlns="" w="9525">
+                <a14:hiddenLine xmlns="" xmlns:a14="http://schemas.microsoft.com/office/drawing/2010/main" w="9525">
                   <a:solidFill>
                     <a:srgbClr val="000000"/>
                   </a:solidFill>
@@ -5076,7 +5077,7 @@
             </a:ln>
             <a:extLst>
               <a:ext uri="{91240B29-F687-4f45-9708-019B960494DF}">
-                <a14:hiddenLine xmlns:a14="http://schemas.microsoft.com/office/drawing/2010/main" xmlns="" w="9525">
+                <a14:hiddenLine xmlns="" xmlns:a14="http://schemas.microsoft.com/office/drawing/2010/main" w="9525">
                   <a:solidFill>
                     <a:srgbClr val="000000"/>
                   </a:solidFill>
@@ -5110,7 +5111,7 @@
             </a:ln>
             <a:extLst>
               <a:ext uri="{91240B29-F687-4f45-9708-019B960494DF}">
-                <a14:hiddenLine xmlns:a14="http://schemas.microsoft.com/office/drawing/2010/main" xmlns="" w="9525">
+                <a14:hiddenLine xmlns="" xmlns:a14="http://schemas.microsoft.com/office/drawing/2010/main" w="9525">
                   <a:solidFill>
                     <a:srgbClr val="000000"/>
                   </a:solidFill>
@@ -5175,7 +5176,7 @@
             </a:ln>
             <a:extLst>
               <a:ext uri="{91240B29-F687-4f45-9708-019B960494DF}">
-                <a14:hiddenLine xmlns:a14="http://schemas.microsoft.com/office/drawing/2010/main" xmlns="" w="9525">
+                <a14:hiddenLine xmlns="" xmlns:a14="http://schemas.microsoft.com/office/drawing/2010/main" w="9525">
                   <a:solidFill>
                     <a:srgbClr val="000000"/>
                   </a:solidFill>
@@ -5265,7 +5266,7 @@
             </a:ln>
             <a:extLst>
               <a:ext uri="{91240B29-F687-4f45-9708-019B960494DF}">
-                <a14:hiddenLine xmlns:a14="http://schemas.microsoft.com/office/drawing/2010/main" xmlns="" w="9525">
+                <a14:hiddenLine xmlns="" xmlns:a14="http://schemas.microsoft.com/office/drawing/2010/main" w="9525">
                   <a:solidFill>
                     <a:srgbClr val="000000"/>
                   </a:solidFill>
@@ -5327,7 +5328,7 @@
             </a:ln>
             <a:extLst>
               <a:ext uri="{91240B29-F687-4f45-9708-019B960494DF}">
-                <a14:hiddenLine xmlns:a14="http://schemas.microsoft.com/office/drawing/2010/main" xmlns="" w="9525">
+                <a14:hiddenLine xmlns="" xmlns:a14="http://schemas.microsoft.com/office/drawing/2010/main" w="9525">
                   <a:solidFill>
                     <a:srgbClr val="000000"/>
                   </a:solidFill>
@@ -5417,7 +5418,7 @@
             </a:ln>
             <a:extLst>
               <a:ext uri="{91240B29-F687-4f45-9708-019B960494DF}">
-                <a14:hiddenLine xmlns:a14="http://schemas.microsoft.com/office/drawing/2010/main" xmlns="" w="9525">
+                <a14:hiddenLine xmlns="" xmlns:a14="http://schemas.microsoft.com/office/drawing/2010/main" w="9525">
                   <a:solidFill>
                     <a:srgbClr val="000000"/>
                   </a:solidFill>
@@ -5507,7 +5508,7 @@
             </a:ln>
             <a:extLst>
               <a:ext uri="{91240B29-F687-4f45-9708-019B960494DF}">
-                <a14:hiddenLine xmlns:a14="http://schemas.microsoft.com/office/drawing/2010/main" xmlns="" w="9525">
+                <a14:hiddenLine xmlns="" xmlns:a14="http://schemas.microsoft.com/office/drawing/2010/main" w="9525">
                   <a:solidFill>
                     <a:srgbClr val="000000"/>
                   </a:solidFill>
@@ -5572,7 +5573,7 @@
             </a:ln>
             <a:extLst>
               <a:ext uri="{91240B29-F687-4f45-9708-019B960494DF}">
-                <a14:hiddenLine xmlns:a14="http://schemas.microsoft.com/office/drawing/2010/main" xmlns="" w="9525">
+                <a14:hiddenLine xmlns="" xmlns:a14="http://schemas.microsoft.com/office/drawing/2010/main" w="9525">
                   <a:solidFill>
                     <a:srgbClr val="000000"/>
                   </a:solidFill>
@@ -5634,7 +5635,7 @@
             </a:ln>
             <a:extLst>
               <a:ext uri="{91240B29-F687-4f45-9708-019B960494DF}">
-                <a14:hiddenLine xmlns:a14="http://schemas.microsoft.com/office/drawing/2010/main" xmlns="" w="9525">
+                <a14:hiddenLine xmlns="" xmlns:a14="http://schemas.microsoft.com/office/drawing/2010/main" w="9525">
                   <a:solidFill>
                     <a:srgbClr val="000000"/>
                   </a:solidFill>
@@ -5724,7 +5725,7 @@
             </a:ln>
             <a:extLst>
               <a:ext uri="{91240B29-F687-4f45-9708-019B960494DF}">
-                <a14:hiddenLine xmlns:a14="http://schemas.microsoft.com/office/drawing/2010/main" xmlns="" w="9525">
+                <a14:hiddenLine xmlns="" xmlns:a14="http://schemas.microsoft.com/office/drawing/2010/main" w="9525">
                   <a:solidFill>
                     <a:srgbClr val="000000"/>
                   </a:solidFill>
@@ -5814,7 +5815,7 @@
             </a:ln>
             <a:extLst>
               <a:ext uri="{91240B29-F687-4f45-9708-019B960494DF}">
-                <a14:hiddenLine xmlns:a14="http://schemas.microsoft.com/office/drawing/2010/main" xmlns="" w="9525">
+                <a14:hiddenLine xmlns="" xmlns:a14="http://schemas.microsoft.com/office/drawing/2010/main" w="9525">
                   <a:solidFill>
                     <a:srgbClr val="000000"/>
                   </a:solidFill>
@@ -5876,7 +5877,7 @@
             </a:ln>
             <a:extLst>
               <a:ext uri="{91240B29-F687-4f45-9708-019B960494DF}">
-                <a14:hiddenLine xmlns:a14="http://schemas.microsoft.com/office/drawing/2010/main" xmlns="" w="9525">
+                <a14:hiddenLine xmlns="" xmlns:a14="http://schemas.microsoft.com/office/drawing/2010/main" w="9525">
                   <a:solidFill>
                     <a:srgbClr val="000000"/>
                   </a:solidFill>
@@ -5996,7 +5997,7 @@
             </a:ln>
             <a:extLst>
               <a:ext uri="{91240B29-F687-4f45-9708-019B960494DF}">
-                <a14:hiddenLine xmlns:a14="http://schemas.microsoft.com/office/drawing/2010/main" xmlns="" w="9525">
+                <a14:hiddenLine xmlns="" xmlns:a14="http://schemas.microsoft.com/office/drawing/2010/main" w="9525">
                   <a:solidFill>
                     <a:srgbClr val="000000"/>
                   </a:solidFill>
@@ -6064,7 +6065,7 @@
             </a:ln>
             <a:extLst>
               <a:ext uri="{91240B29-F687-4f45-9708-019B960494DF}">
-                <a14:hiddenLine xmlns:a14="http://schemas.microsoft.com/office/drawing/2010/main" xmlns="" w="9525">
+                <a14:hiddenLine xmlns="" xmlns:a14="http://schemas.microsoft.com/office/drawing/2010/main" w="9525">
                   <a:solidFill>
                     <a:srgbClr val="000000"/>
                   </a:solidFill>
@@ -6154,7 +6155,7 @@
             </a:ln>
             <a:extLst>
               <a:ext uri="{91240B29-F687-4f45-9708-019B960494DF}">
-                <a14:hiddenLine xmlns:a14="http://schemas.microsoft.com/office/drawing/2010/main" xmlns="" w="9525">
+                <a14:hiddenLine xmlns="" xmlns:a14="http://schemas.microsoft.com/office/drawing/2010/main" w="9525">
                   <a:solidFill>
                     <a:srgbClr val="000000"/>
                   </a:solidFill>
@@ -6294,7 +6295,7 @@
           <a:p>
             <a:fld id="{3DCD2A52-F1BC-4EAF-B7E8-F7BAB34BE210}" type="datetimeFigureOut">
               <a:rPr lang="en-GB" smtClean="0"/>
-              <a:t>27/09/2017</a:t>
+              <a:t>28/09/2017</a:t>
             </a:fld>
             <a:endParaRPr lang="en-GB"/>
           </a:p>
@@ -6561,7 +6562,7 @@
           <a:p>
             <a:fld id="{3DCD2A52-F1BC-4EAF-B7E8-F7BAB34BE210}" type="datetimeFigureOut">
               <a:rPr lang="en-GB" smtClean="0"/>
-              <a:t>27/09/2017</a:t>
+              <a:t>28/09/2017</a:t>
             </a:fld>
             <a:endParaRPr lang="en-GB"/>
           </a:p>
@@ -6757,7 +6758,7 @@
           <a:p>
             <a:fld id="{3DCD2A52-F1BC-4EAF-B7E8-F7BAB34BE210}" type="datetimeFigureOut">
               <a:rPr lang="en-GB" smtClean="0"/>
-              <a:t>27/09/2017</a:t>
+              <a:t>28/09/2017</a:t>
             </a:fld>
             <a:endParaRPr lang="en-GB"/>
           </a:p>
@@ -7020,7 +7021,7 @@
           <a:p>
             <a:fld id="{3DCD2A52-F1BC-4EAF-B7E8-F7BAB34BE210}" type="datetimeFigureOut">
               <a:rPr lang="en-GB" smtClean="0"/>
-              <a:t>27/09/2017</a:t>
+              <a:t>28/09/2017</a:t>
             </a:fld>
             <a:endParaRPr lang="en-GB"/>
           </a:p>
@@ -7454,7 +7455,7 @@
           <a:p>
             <a:fld id="{3DCD2A52-F1BC-4EAF-B7E8-F7BAB34BE210}" type="datetimeFigureOut">
               <a:rPr lang="en-GB" smtClean="0"/>
-              <a:t>27/09/2017</a:t>
+              <a:t>28/09/2017</a:t>
             </a:fld>
             <a:endParaRPr lang="en-GB"/>
           </a:p>
@@ -8000,7 +8001,7 @@
           <a:p>
             <a:fld id="{3DCD2A52-F1BC-4EAF-B7E8-F7BAB34BE210}" type="datetimeFigureOut">
               <a:rPr lang="en-GB" smtClean="0"/>
-              <a:t>27/09/2017</a:t>
+              <a:t>28/09/2017</a:t>
             </a:fld>
             <a:endParaRPr lang="en-GB"/>
           </a:p>
@@ -8720,7 +8721,7 @@
           <a:p>
             <a:fld id="{3DCD2A52-F1BC-4EAF-B7E8-F7BAB34BE210}" type="datetimeFigureOut">
               <a:rPr lang="en-GB" smtClean="0"/>
-              <a:t>27/09/2017</a:t>
+              <a:t>28/09/2017</a:t>
             </a:fld>
             <a:endParaRPr lang="en-GB"/>
           </a:p>
@@ -8890,7 +8891,7 @@
           <a:p>
             <a:fld id="{3DCD2A52-F1BC-4EAF-B7E8-F7BAB34BE210}" type="datetimeFigureOut">
               <a:rPr lang="en-GB" smtClean="0"/>
-              <a:t>27/09/2017</a:t>
+              <a:t>28/09/2017</a:t>
             </a:fld>
             <a:endParaRPr lang="en-GB"/>
           </a:p>
@@ -9070,7 +9071,7 @@
           <a:p>
             <a:fld id="{3DCD2A52-F1BC-4EAF-B7E8-F7BAB34BE210}" type="datetimeFigureOut">
               <a:rPr lang="en-GB" smtClean="0"/>
-              <a:t>27/09/2017</a:t>
+              <a:t>28/09/2017</a:t>
             </a:fld>
             <a:endParaRPr lang="en-GB"/>
           </a:p>
@@ -9240,7 +9241,7 @@
           <a:p>
             <a:fld id="{3DCD2A52-F1BC-4EAF-B7E8-F7BAB34BE210}" type="datetimeFigureOut">
               <a:rPr lang="en-GB" smtClean="0"/>
-              <a:t>27/09/2017</a:t>
+              <a:t>28/09/2017</a:t>
             </a:fld>
             <a:endParaRPr lang="en-GB"/>
           </a:p>
@@ -9490,7 +9491,7 @@
           <a:p>
             <a:fld id="{3DCD2A52-F1BC-4EAF-B7E8-F7BAB34BE210}" type="datetimeFigureOut">
               <a:rPr lang="en-GB" smtClean="0"/>
-              <a:t>27/09/2017</a:t>
+              <a:t>28/09/2017</a:t>
             </a:fld>
             <a:endParaRPr lang="en-GB"/>
           </a:p>
@@ -9722,7 +9723,7 @@
           <a:p>
             <a:fld id="{3DCD2A52-F1BC-4EAF-B7E8-F7BAB34BE210}" type="datetimeFigureOut">
               <a:rPr lang="en-GB" smtClean="0"/>
-              <a:t>27/09/2017</a:t>
+              <a:t>28/09/2017</a:t>
             </a:fld>
             <a:endParaRPr lang="en-GB"/>
           </a:p>
@@ -10103,7 +10104,7 @@
           <a:p>
             <a:fld id="{3DCD2A52-F1BC-4EAF-B7E8-F7BAB34BE210}" type="datetimeFigureOut">
               <a:rPr lang="en-GB" smtClean="0"/>
-              <a:t>27/09/2017</a:t>
+              <a:t>28/09/2017</a:t>
             </a:fld>
             <a:endParaRPr lang="en-GB"/>
           </a:p>
@@ -10221,7 +10222,7 @@
           <a:p>
             <a:fld id="{3DCD2A52-F1BC-4EAF-B7E8-F7BAB34BE210}" type="datetimeFigureOut">
               <a:rPr lang="en-GB" smtClean="0"/>
-              <a:t>27/09/2017</a:t>
+              <a:t>28/09/2017</a:t>
             </a:fld>
             <a:endParaRPr lang="en-GB"/>
           </a:p>
@@ -10316,7 +10317,7 @@
           <a:p>
             <a:fld id="{3DCD2A52-F1BC-4EAF-B7E8-F7BAB34BE210}" type="datetimeFigureOut">
               <a:rPr lang="en-GB" smtClean="0"/>
-              <a:t>27/09/2017</a:t>
+              <a:t>28/09/2017</a:t>
             </a:fld>
             <a:endParaRPr lang="en-GB"/>
           </a:p>
@@ -10565,7 +10566,7 @@
           <a:p>
             <a:fld id="{3DCD2A52-F1BC-4EAF-B7E8-F7BAB34BE210}" type="datetimeFigureOut">
               <a:rPr lang="en-GB" smtClean="0"/>
-              <a:t>27/09/2017</a:t>
+              <a:t>28/09/2017</a:t>
             </a:fld>
             <a:endParaRPr lang="en-GB"/>
           </a:p>
@@ -10845,7 +10846,7 @@
           <a:p>
             <a:fld id="{3DCD2A52-F1BC-4EAF-B7E8-F7BAB34BE210}" type="datetimeFigureOut">
               <a:rPr lang="en-GB" smtClean="0"/>
-              <a:t>27/09/2017</a:t>
+              <a:t>28/09/2017</a:t>
             </a:fld>
             <a:endParaRPr lang="en-GB"/>
           </a:p>
@@ -10961,7 +10962,7 @@
           <a:noFill/>
           <a:extLst>
             <a:ext uri="{909E8E84-426E-40dd-AFC4-6F175D3DCCD1}">
-              <a14:hiddenFill xmlns:a14="http://schemas.microsoft.com/office/drawing/2010/main" xmlns="">
+              <a14:hiddenFill xmlns="" xmlns:a14="http://schemas.microsoft.com/office/drawing/2010/main">
                 <a:solidFill>
                   <a:srgbClr val="FFFFFF"/>
                 </a:solidFill>
@@ -11035,7 +11036,7 @@
               </a:ln>
               <a:extLst>
                 <a:ext uri="{91240B29-F687-4f45-9708-019B960494DF}">
-                  <a14:hiddenLine xmlns:a14="http://schemas.microsoft.com/office/drawing/2010/main" xmlns="" w="9525">
+                  <a14:hiddenLine xmlns="" xmlns:a14="http://schemas.microsoft.com/office/drawing/2010/main" w="9525">
                     <a:solidFill>
                       <a:srgbClr val="000000"/>
                     </a:solidFill>
@@ -11125,7 +11126,7 @@
               </a:ln>
               <a:extLst>
                 <a:ext uri="{91240B29-F687-4f45-9708-019B960494DF}">
-                  <a14:hiddenLine xmlns:a14="http://schemas.microsoft.com/office/drawing/2010/main" xmlns="" w="9525">
+                  <a14:hiddenLine xmlns="" xmlns:a14="http://schemas.microsoft.com/office/drawing/2010/main" w="9525">
                     <a:solidFill>
                       <a:srgbClr val="000000"/>
                     </a:solidFill>
@@ -11215,7 +11216,7 @@
               </a:ln>
               <a:extLst>
                 <a:ext uri="{91240B29-F687-4f45-9708-019B960494DF}">
-                  <a14:hiddenLine xmlns:a14="http://schemas.microsoft.com/office/drawing/2010/main" xmlns="" w="9525">
+                  <a14:hiddenLine xmlns="" xmlns:a14="http://schemas.microsoft.com/office/drawing/2010/main" w="9525">
                     <a:solidFill>
                       <a:srgbClr val="000000"/>
                     </a:solidFill>
@@ -11277,7 +11278,7 @@
               </a:ln>
               <a:extLst>
                 <a:ext uri="{91240B29-F687-4f45-9708-019B960494DF}">
-                  <a14:hiddenLine xmlns:a14="http://schemas.microsoft.com/office/drawing/2010/main" xmlns="" w="9525">
+                  <a14:hiddenLine xmlns="" xmlns:a14="http://schemas.microsoft.com/office/drawing/2010/main" w="9525">
                     <a:solidFill>
                       <a:srgbClr val="000000"/>
                     </a:solidFill>
@@ -11367,7 +11368,7 @@
               </a:ln>
               <a:extLst>
                 <a:ext uri="{91240B29-F687-4f45-9708-019B960494DF}">
-                  <a14:hiddenLine xmlns:a14="http://schemas.microsoft.com/office/drawing/2010/main" xmlns="" w="9525">
+                  <a14:hiddenLine xmlns="" xmlns:a14="http://schemas.microsoft.com/office/drawing/2010/main" w="9525">
                     <a:solidFill>
                       <a:srgbClr val="000000"/>
                     </a:solidFill>
@@ -11429,7 +11430,7 @@
               </a:ln>
               <a:extLst>
                 <a:ext uri="{91240B29-F687-4f45-9708-019B960494DF}">
-                  <a14:hiddenLine xmlns:a14="http://schemas.microsoft.com/office/drawing/2010/main" xmlns="" w="9525">
+                  <a14:hiddenLine xmlns="" xmlns:a14="http://schemas.microsoft.com/office/drawing/2010/main" w="9525">
                     <a:solidFill>
                       <a:srgbClr val="000000"/>
                     </a:solidFill>
@@ -11491,7 +11492,7 @@
               </a:ln>
               <a:extLst>
                 <a:ext uri="{91240B29-F687-4f45-9708-019B960494DF}">
-                  <a14:hiddenLine xmlns:a14="http://schemas.microsoft.com/office/drawing/2010/main" xmlns="" w="9525">
+                  <a14:hiddenLine xmlns="" xmlns:a14="http://schemas.microsoft.com/office/drawing/2010/main" w="9525">
                     <a:solidFill>
                       <a:srgbClr val="000000"/>
                     </a:solidFill>
@@ -11581,7 +11582,7 @@
               </a:ln>
               <a:extLst>
                 <a:ext uri="{91240B29-F687-4f45-9708-019B960494DF}">
-                  <a14:hiddenLine xmlns:a14="http://schemas.microsoft.com/office/drawing/2010/main" xmlns="" w="9525">
+                  <a14:hiddenLine xmlns="" xmlns:a14="http://schemas.microsoft.com/office/drawing/2010/main" w="9525">
                     <a:solidFill>
                       <a:srgbClr val="000000"/>
                     </a:solidFill>
@@ -11671,7 +11672,7 @@
               </a:ln>
               <a:extLst>
                 <a:ext uri="{91240B29-F687-4f45-9708-019B960494DF}">
-                  <a14:hiddenLine xmlns:a14="http://schemas.microsoft.com/office/drawing/2010/main" xmlns="" w="9525">
+                  <a14:hiddenLine xmlns="" xmlns:a14="http://schemas.microsoft.com/office/drawing/2010/main" w="9525">
                     <a:solidFill>
                       <a:srgbClr val="000000"/>
                     </a:solidFill>
@@ -11733,7 +11734,7 @@
               </a:ln>
               <a:extLst>
                 <a:ext uri="{91240B29-F687-4f45-9708-019B960494DF}">
-                  <a14:hiddenLine xmlns:a14="http://schemas.microsoft.com/office/drawing/2010/main" xmlns="" w="9525">
+                  <a14:hiddenLine xmlns="" xmlns:a14="http://schemas.microsoft.com/office/drawing/2010/main" w="9525">
                     <a:solidFill>
                       <a:srgbClr val="000000"/>
                     </a:solidFill>
@@ -11843,7 +11844,7 @@
               </a:ln>
               <a:extLst>
                 <a:ext uri="{91240B29-F687-4f45-9708-019B960494DF}">
-                  <a14:hiddenLine xmlns:a14="http://schemas.microsoft.com/office/drawing/2010/main" xmlns="" w="9525">
+                  <a14:hiddenLine xmlns="" xmlns:a14="http://schemas.microsoft.com/office/drawing/2010/main" w="9525">
                     <a:solidFill>
                       <a:srgbClr val="000000"/>
                     </a:solidFill>
@@ -11927,7 +11928,7 @@
               </a:ln>
               <a:extLst>
                 <a:ext uri="{91240B29-F687-4f45-9708-019B960494DF}">
-                  <a14:hiddenLine xmlns:a14="http://schemas.microsoft.com/office/drawing/2010/main" xmlns="" w="9525">
+                  <a14:hiddenLine xmlns="" xmlns:a14="http://schemas.microsoft.com/office/drawing/2010/main" w="9525">
                     <a:solidFill>
                       <a:srgbClr val="000000"/>
                     </a:solidFill>
@@ -11989,7 +11990,7 @@
               </a:ln>
               <a:extLst>
                 <a:ext uri="{91240B29-F687-4f45-9708-019B960494DF}">
-                  <a14:hiddenLine xmlns:a14="http://schemas.microsoft.com/office/drawing/2010/main" xmlns="" w="9525">
+                  <a14:hiddenLine xmlns="" xmlns:a14="http://schemas.microsoft.com/office/drawing/2010/main" w="9525">
                     <a:solidFill>
                       <a:srgbClr val="000000"/>
                     </a:solidFill>
@@ -12051,7 +12052,7 @@
               </a:ln>
               <a:extLst>
                 <a:ext uri="{91240B29-F687-4f45-9708-019B960494DF}">
-                  <a14:hiddenLine xmlns:a14="http://schemas.microsoft.com/office/drawing/2010/main" xmlns="" w="9525">
+                  <a14:hiddenLine xmlns="" xmlns:a14="http://schemas.microsoft.com/office/drawing/2010/main" w="9525">
                     <a:solidFill>
                       <a:srgbClr val="000000"/>
                     </a:solidFill>
@@ -12141,7 +12142,7 @@
               </a:ln>
               <a:extLst>
                 <a:ext uri="{91240B29-F687-4f45-9708-019B960494DF}">
-                  <a14:hiddenLine xmlns:a14="http://schemas.microsoft.com/office/drawing/2010/main" xmlns="" w="9525">
+                  <a14:hiddenLine xmlns="" xmlns:a14="http://schemas.microsoft.com/office/drawing/2010/main" w="9525">
                     <a:solidFill>
                       <a:srgbClr val="000000"/>
                     </a:solidFill>
@@ -12175,7 +12176,7 @@
               </a:ln>
               <a:extLst>
                 <a:ext uri="{91240B29-F687-4f45-9708-019B960494DF}">
-                  <a14:hiddenLine xmlns:a14="http://schemas.microsoft.com/office/drawing/2010/main" xmlns="" w="9525">
+                  <a14:hiddenLine xmlns="" xmlns:a14="http://schemas.microsoft.com/office/drawing/2010/main" w="9525">
                     <a:solidFill>
                       <a:srgbClr val="000000"/>
                     </a:solidFill>
@@ -12240,7 +12241,7 @@
               </a:ln>
               <a:extLst>
                 <a:ext uri="{91240B29-F687-4f45-9708-019B960494DF}">
-                  <a14:hiddenLine xmlns:a14="http://schemas.microsoft.com/office/drawing/2010/main" xmlns="" w="9525">
+                  <a14:hiddenLine xmlns="" xmlns:a14="http://schemas.microsoft.com/office/drawing/2010/main" w="9525">
                     <a:solidFill>
                       <a:srgbClr val="000000"/>
                     </a:solidFill>
@@ -12330,7 +12331,7 @@
               </a:ln>
               <a:extLst>
                 <a:ext uri="{91240B29-F687-4f45-9708-019B960494DF}">
-                  <a14:hiddenLine xmlns:a14="http://schemas.microsoft.com/office/drawing/2010/main" xmlns="" w="9525">
+                  <a14:hiddenLine xmlns="" xmlns:a14="http://schemas.microsoft.com/office/drawing/2010/main" w="9525">
                     <a:solidFill>
                       <a:srgbClr val="000000"/>
                     </a:solidFill>
@@ -12392,7 +12393,7 @@
               </a:ln>
               <a:extLst>
                 <a:ext uri="{91240B29-F687-4f45-9708-019B960494DF}">
-                  <a14:hiddenLine xmlns:a14="http://schemas.microsoft.com/office/drawing/2010/main" xmlns="" w="9525">
+                  <a14:hiddenLine xmlns="" xmlns:a14="http://schemas.microsoft.com/office/drawing/2010/main" w="9525">
                     <a:solidFill>
                       <a:srgbClr val="000000"/>
                     </a:solidFill>
@@ -12482,7 +12483,7 @@
               </a:ln>
               <a:extLst>
                 <a:ext uri="{91240B29-F687-4f45-9708-019B960494DF}">
-                  <a14:hiddenLine xmlns:a14="http://schemas.microsoft.com/office/drawing/2010/main" xmlns="" w="9525">
+                  <a14:hiddenLine xmlns="" xmlns:a14="http://schemas.microsoft.com/office/drawing/2010/main" w="9525">
                     <a:solidFill>
                       <a:srgbClr val="000000"/>
                     </a:solidFill>
@@ -12547,7 +12548,7 @@
               </a:ln>
               <a:extLst>
                 <a:ext uri="{91240B29-F687-4f45-9708-019B960494DF}">
-                  <a14:hiddenLine xmlns:a14="http://schemas.microsoft.com/office/drawing/2010/main" xmlns="" w="9525">
+                  <a14:hiddenLine xmlns="" xmlns:a14="http://schemas.microsoft.com/office/drawing/2010/main" w="9525">
                     <a:solidFill>
                       <a:srgbClr val="000000"/>
                     </a:solidFill>
@@ -12609,7 +12610,7 @@
               </a:ln>
               <a:extLst>
                 <a:ext uri="{91240B29-F687-4f45-9708-019B960494DF}">
-                  <a14:hiddenLine xmlns:a14="http://schemas.microsoft.com/office/drawing/2010/main" xmlns="" w="9525">
+                  <a14:hiddenLine xmlns="" xmlns:a14="http://schemas.microsoft.com/office/drawing/2010/main" w="9525">
                     <a:solidFill>
                       <a:srgbClr val="000000"/>
                     </a:solidFill>
@@ -12699,7 +12700,7 @@
               </a:ln>
               <a:extLst>
                 <a:ext uri="{91240B29-F687-4f45-9708-019B960494DF}">
-                  <a14:hiddenLine xmlns:a14="http://schemas.microsoft.com/office/drawing/2010/main" xmlns="" w="9525">
+                  <a14:hiddenLine xmlns="" xmlns:a14="http://schemas.microsoft.com/office/drawing/2010/main" w="9525">
                     <a:solidFill>
                       <a:srgbClr val="000000"/>
                     </a:solidFill>
@@ -12789,7 +12790,7 @@
               </a:ln>
               <a:extLst>
                 <a:ext uri="{91240B29-F687-4f45-9708-019B960494DF}">
-                  <a14:hiddenLine xmlns:a14="http://schemas.microsoft.com/office/drawing/2010/main" xmlns="" w="9525">
+                  <a14:hiddenLine xmlns="" xmlns:a14="http://schemas.microsoft.com/office/drawing/2010/main" w="9525">
                     <a:solidFill>
                       <a:srgbClr val="000000"/>
                     </a:solidFill>
@@ -12854,7 +12855,7 @@
               </a:ln>
               <a:extLst>
                 <a:ext uri="{91240B29-F687-4f45-9708-019B960494DF}">
-                  <a14:hiddenLine xmlns:a14="http://schemas.microsoft.com/office/drawing/2010/main" xmlns="" w="9525">
+                  <a14:hiddenLine xmlns="" xmlns:a14="http://schemas.microsoft.com/office/drawing/2010/main" w="9525">
                     <a:solidFill>
                       <a:srgbClr val="000000"/>
                     </a:solidFill>
@@ -12974,7 +12975,7 @@
               </a:ln>
               <a:extLst>
                 <a:ext uri="{91240B29-F687-4f45-9708-019B960494DF}">
-                  <a14:hiddenLine xmlns:a14="http://schemas.microsoft.com/office/drawing/2010/main" xmlns="" w="9525">
+                  <a14:hiddenLine xmlns="" xmlns:a14="http://schemas.microsoft.com/office/drawing/2010/main" w="9525">
                     <a:solidFill>
                       <a:srgbClr val="000000"/>
                     </a:solidFill>
@@ -13072,7 +13073,7 @@
               </a:ln>
               <a:extLst>
                 <a:ext uri="{91240B29-F687-4f45-9708-019B960494DF}">
-                  <a14:hiddenLine xmlns:a14="http://schemas.microsoft.com/office/drawing/2010/main" xmlns="" w="9525">
+                  <a14:hiddenLine xmlns="" xmlns:a14="http://schemas.microsoft.com/office/drawing/2010/main" w="9525">
                     <a:solidFill>
                       <a:srgbClr val="000000"/>
                     </a:solidFill>
@@ -13187,7 +13188,7 @@
               </a:ln>
               <a:extLst>
                 <a:ext uri="{91240B29-F687-4f45-9708-019B960494DF}">
-                  <a14:hiddenLine xmlns:a14="http://schemas.microsoft.com/office/drawing/2010/main" xmlns="" w="9525">
+                  <a14:hiddenLine xmlns="" xmlns:a14="http://schemas.microsoft.com/office/drawing/2010/main" w="9525">
                     <a:solidFill>
                       <a:srgbClr val="000000"/>
                     </a:solidFill>
@@ -13277,7 +13278,7 @@
               </a:ln>
               <a:extLst>
                 <a:ext uri="{91240B29-F687-4f45-9708-019B960494DF}">
-                  <a14:hiddenLine xmlns:a14="http://schemas.microsoft.com/office/drawing/2010/main" xmlns="" w="9525">
+                  <a14:hiddenLine xmlns="" xmlns:a14="http://schemas.microsoft.com/office/drawing/2010/main" w="9525">
                     <a:solidFill>
                       <a:srgbClr val="000000"/>
                     </a:solidFill>
@@ -13342,7 +13343,7 @@
               </a:ln>
               <a:extLst>
                 <a:ext uri="{91240B29-F687-4f45-9708-019B960494DF}">
-                  <a14:hiddenLine xmlns:a14="http://schemas.microsoft.com/office/drawing/2010/main" xmlns="" w="9525">
+                  <a14:hiddenLine xmlns="" xmlns:a14="http://schemas.microsoft.com/office/drawing/2010/main" w="9525">
                     <a:solidFill>
                       <a:srgbClr val="000000"/>
                     </a:solidFill>
@@ -13432,7 +13433,7 @@
               </a:ln>
               <a:extLst>
                 <a:ext uri="{91240B29-F687-4f45-9708-019B960494DF}">
-                  <a14:hiddenLine xmlns:a14="http://schemas.microsoft.com/office/drawing/2010/main" xmlns="" w="9525">
+                  <a14:hiddenLine xmlns="" xmlns:a14="http://schemas.microsoft.com/office/drawing/2010/main" w="9525">
                     <a:solidFill>
                       <a:srgbClr val="000000"/>
                     </a:solidFill>
@@ -13500,7 +13501,7 @@
               </a:ln>
               <a:extLst>
                 <a:ext uri="{91240B29-F687-4f45-9708-019B960494DF}">
-                  <a14:hiddenLine xmlns:a14="http://schemas.microsoft.com/office/drawing/2010/main" xmlns="" w="9525">
+                  <a14:hiddenLine xmlns="" xmlns:a14="http://schemas.microsoft.com/office/drawing/2010/main" w="9525">
                     <a:solidFill>
                       <a:srgbClr val="000000"/>
                     </a:solidFill>
@@ -13590,7 +13591,7 @@
               </a:ln>
               <a:extLst>
                 <a:ext uri="{91240B29-F687-4f45-9708-019B960494DF}">
-                  <a14:hiddenLine xmlns:a14="http://schemas.microsoft.com/office/drawing/2010/main" xmlns="" w="9525">
+                  <a14:hiddenLine xmlns="" xmlns:a14="http://schemas.microsoft.com/office/drawing/2010/main" w="9525">
                     <a:solidFill>
                       <a:srgbClr val="000000"/>
                     </a:solidFill>
@@ -13658,7 +13659,7 @@
               </a:ln>
               <a:extLst>
                 <a:ext uri="{91240B29-F687-4f45-9708-019B960494DF}">
-                  <a14:hiddenLine xmlns:a14="http://schemas.microsoft.com/office/drawing/2010/main" xmlns="" w="9525">
+                  <a14:hiddenLine xmlns="" xmlns:a14="http://schemas.microsoft.com/office/drawing/2010/main" w="9525">
                     <a:solidFill>
                       <a:srgbClr val="000000"/>
                     </a:solidFill>
@@ -13748,7 +13749,7 @@
               </a:ln>
               <a:extLst>
                 <a:ext uri="{91240B29-F687-4f45-9708-019B960494DF}">
-                  <a14:hiddenLine xmlns:a14="http://schemas.microsoft.com/office/drawing/2010/main" xmlns="" w="9525">
+                  <a14:hiddenLine xmlns="" xmlns:a14="http://schemas.microsoft.com/office/drawing/2010/main" w="9525">
                     <a:solidFill>
                       <a:srgbClr val="000000"/>
                     </a:solidFill>
@@ -13782,7 +13783,7 @@
               </a:ln>
               <a:extLst>
                 <a:ext uri="{91240B29-F687-4f45-9708-019B960494DF}">
-                  <a14:hiddenLine xmlns:a14="http://schemas.microsoft.com/office/drawing/2010/main" xmlns="" w="9525">
+                  <a14:hiddenLine xmlns="" xmlns:a14="http://schemas.microsoft.com/office/drawing/2010/main" w="9525">
                     <a:solidFill>
                       <a:srgbClr val="000000"/>
                     </a:solidFill>
@@ -13922,7 +13923,7 @@
           <a:p>
             <a:fld id="{3DCD2A52-F1BC-4EAF-B7E8-F7BAB34BE210}" type="datetimeFigureOut">
               <a:rPr lang="en-GB" smtClean="0"/>
-              <a:t>27/09/2017</a:t>
+              <a:t>28/09/2017</a:t>
             </a:fld>
             <a:endParaRPr lang="en-GB"/>
           </a:p>
@@ -14365,7 +14366,7 @@
           <a:p>
             <a:r>
               <a:rPr lang="en-GB" dirty="0"/>
-              <a:t>Passion Games</a:t>
+              <a:t>Dark Dealings</a:t>
             </a:r>
           </a:p>
         </p:txBody>
@@ -14396,13 +14397,8 @@
           <a:p>
             <a:r>
               <a:rPr lang="en-GB" dirty="0"/>
-              <a:t>Ghostly </a:t>
-            </a:r>
-            <a:r>
-              <a:rPr lang="en-GB" dirty="0" err="1"/>
-              <a:t>SpyMaster</a:t>
-            </a:r>
-            <a:endParaRPr lang="en-GB" dirty="0"/>
+              <a:t>Passion Games</a:t>
+            </a:r>
           </a:p>
         </p:txBody>
       </p:sp>
@@ -15122,6 +15118,104 @@
     <p:extLst>
       <p:ext uri="{BB962C8B-B14F-4D97-AF65-F5344CB8AC3E}">
         <p14:creationId xmlns:p14="http://schemas.microsoft.com/office/powerpoint/2010/main" val="4114613970"/>
+      </p:ext>
+    </p:extLst>
+  </p:cSld>
+  <p:clrMapOvr>
+    <a:masterClrMapping/>
+  </p:clrMapOvr>
+</p:sld>
+</file>
+
+<file path=ppt/slides/slide15.xml><?xml version="1.0" encoding="utf-8"?>
+<p:sld xmlns:a="http://schemas.openxmlformats.org/drawingml/2006/main" xmlns:r="http://schemas.openxmlformats.org/officeDocument/2006/relationships" xmlns:p="http://schemas.openxmlformats.org/presentationml/2006/main">
+  <p:cSld>
+    <p:spTree>
+      <p:nvGrpSpPr>
+        <p:cNvPr id="1" name=""/>
+        <p:cNvGrpSpPr/>
+        <p:nvPr/>
+      </p:nvGrpSpPr>
+      <p:grpSpPr>
+        <a:xfrm>
+          <a:off x="0" y="0"/>
+          <a:ext cx="0" cy="0"/>
+          <a:chOff x="0" y="0"/>
+          <a:chExt cx="0" cy="0"/>
+        </a:xfrm>
+      </p:grpSpPr>
+      <p:sp>
+        <p:nvSpPr>
+          <p:cNvPr id="2" name="Title 1">
+            <a:extLst>
+              <a:ext uri="{FF2B5EF4-FFF2-40B4-BE49-F238E27FC236}">
+                <a16:creationId xmlns:a16="http://schemas.microsoft.com/office/drawing/2014/main" id="{9541390E-00A0-44E3-9102-9E2528F4E1E4}"/>
+              </a:ext>
+            </a:extLst>
+          </p:cNvPr>
+          <p:cNvSpPr>
+            <a:spLocks noGrp="1"/>
+          </p:cNvSpPr>
+          <p:nvPr>
+            <p:ph type="title"/>
+          </p:nvPr>
+        </p:nvSpPr>
+        <p:spPr/>
+        <p:txBody>
+          <a:bodyPr/>
+          <a:lstStyle/>
+          <a:p>
+            <a:r>
+              <a:rPr lang="en-GB" dirty="0"/>
+              <a:t>Thank You</a:t>
+            </a:r>
+          </a:p>
+        </p:txBody>
+      </p:sp>
+      <p:sp>
+        <p:nvSpPr>
+          <p:cNvPr id="3" name="Content Placeholder 2">
+            <a:extLst>
+              <a:ext uri="{FF2B5EF4-FFF2-40B4-BE49-F238E27FC236}">
+                <a16:creationId xmlns:a16="http://schemas.microsoft.com/office/drawing/2014/main" id="{5A7D6DEC-33F6-4F33-9C0B-7D37E1E1703E}"/>
+              </a:ext>
+            </a:extLst>
+          </p:cNvPr>
+          <p:cNvSpPr>
+            <a:spLocks noGrp="1"/>
+          </p:cNvSpPr>
+          <p:nvPr>
+            <p:ph idx="1"/>
+          </p:nvPr>
+        </p:nvSpPr>
+        <p:spPr/>
+        <p:txBody>
+          <a:bodyPr/>
+          <a:lstStyle/>
+          <a:p>
+            <a:pPr marL="0" indent="0">
+              <a:buNone/>
+            </a:pPr>
+            <a:r>
+              <a:rPr lang="en-GB" dirty="0"/>
+              <a:t>Thank you for listening. </a:t>
+            </a:r>
+          </a:p>
+          <a:p>
+            <a:pPr marL="0" indent="0">
+              <a:buNone/>
+            </a:pPr>
+            <a:r>
+              <a:rPr lang="en-GB" dirty="0"/>
+              <a:t>We will be happy to answer any questions you may have.</a:t>
+            </a:r>
+          </a:p>
+        </p:txBody>
+      </p:sp>
+    </p:spTree>
+    <p:extLst>
+      <p:ext uri="{BB962C8B-B14F-4D97-AF65-F5344CB8AC3E}">
+        <p14:creationId xmlns:p14="http://schemas.microsoft.com/office/powerpoint/2010/main" val="1990120110"/>
       </p:ext>
     </p:extLst>
   </p:cSld>

</xml_diff>